<commit_message>
Project work: udates, restructuring, add new features, etc
</commit_message>
<xml_diff>
--- a/SkylifterProjectPresentation/SkyLifter Project Presentation.pptx
+++ b/SkylifterProjectPresentation/SkyLifter Project Presentation.pptx
@@ -5,7 +5,7 @@
     <p:sldMasterId id="2147483648" r:id="rId1"/>
   </p:sldMasterIdLst>
   <p:notesMasterIdLst>
-    <p:notesMasterId r:id="rId9"/>
+    <p:notesMasterId r:id="rId11"/>
   </p:notesMasterIdLst>
   <p:sldIdLst>
     <p:sldId id="256" r:id="rId2"/>
@@ -13,8 +13,10 @@
     <p:sldId id="259" r:id="rId4"/>
     <p:sldId id="260" r:id="rId5"/>
     <p:sldId id="261" r:id="rId6"/>
-    <p:sldId id="262" r:id="rId7"/>
-    <p:sldId id="257" r:id="rId8"/>
+    <p:sldId id="264" r:id="rId7"/>
+    <p:sldId id="262" r:id="rId8"/>
+    <p:sldId id="257" r:id="rId9"/>
+    <p:sldId id="263" r:id="rId10"/>
   </p:sldIdLst>
   <p:sldSz cx="12192000" cy="6858000"/>
   <p:notesSz cx="6858000" cy="9144000"/>
@@ -203,7 +205,7 @@
           <a:p>
             <a:fld id="{3D973977-C0D9-DB49-8187-D2BF8922BAEB}" type="datetimeFigureOut">
               <a:rPr lang="en-US" smtClean="0"/>
-              <a:t>9/23/17</a:t>
+              <a:t>9/26/17</a:t>
             </a:fld>
             <a:endParaRPr lang="en-US"/>
           </a:p>
@@ -602,7 +604,7 @@
           <a:p>
             <a:fld id="{B885FAB1-7D4C-834A-BFBE-22EE9308C045}" type="datetimeFigureOut">
               <a:rPr lang="en-US" smtClean="0"/>
-              <a:t>9/23/17</a:t>
+              <a:t>9/26/17</a:t>
             </a:fld>
             <a:endParaRPr lang="en-US"/>
           </a:p>
@@ -772,7 +774,7 @@
           <a:p>
             <a:fld id="{B885FAB1-7D4C-834A-BFBE-22EE9308C045}" type="datetimeFigureOut">
               <a:rPr lang="en-US" smtClean="0"/>
-              <a:t>9/23/17</a:t>
+              <a:t>9/26/17</a:t>
             </a:fld>
             <a:endParaRPr lang="en-US"/>
           </a:p>
@@ -952,7 +954,7 @@
           <a:p>
             <a:fld id="{B885FAB1-7D4C-834A-BFBE-22EE9308C045}" type="datetimeFigureOut">
               <a:rPr lang="en-US" smtClean="0"/>
-              <a:t>9/23/17</a:t>
+              <a:t>9/26/17</a:t>
             </a:fld>
             <a:endParaRPr lang="en-US"/>
           </a:p>
@@ -1122,7 +1124,7 @@
           <a:p>
             <a:fld id="{B885FAB1-7D4C-834A-BFBE-22EE9308C045}" type="datetimeFigureOut">
               <a:rPr lang="en-US" smtClean="0"/>
-              <a:t>9/23/17</a:t>
+              <a:t>9/26/17</a:t>
             </a:fld>
             <a:endParaRPr lang="en-US"/>
           </a:p>
@@ -1368,7 +1370,7 @@
           <a:p>
             <a:fld id="{B885FAB1-7D4C-834A-BFBE-22EE9308C045}" type="datetimeFigureOut">
               <a:rPr lang="en-US" smtClean="0"/>
-              <a:t>9/23/17</a:t>
+              <a:t>9/26/17</a:t>
             </a:fld>
             <a:endParaRPr lang="en-US"/>
           </a:p>
@@ -1600,7 +1602,7 @@
           <a:p>
             <a:fld id="{B885FAB1-7D4C-834A-BFBE-22EE9308C045}" type="datetimeFigureOut">
               <a:rPr lang="en-US" smtClean="0"/>
-              <a:t>9/23/17</a:t>
+              <a:t>9/26/17</a:t>
             </a:fld>
             <a:endParaRPr lang="en-US"/>
           </a:p>
@@ -1967,7 +1969,7 @@
           <a:p>
             <a:fld id="{B885FAB1-7D4C-834A-BFBE-22EE9308C045}" type="datetimeFigureOut">
               <a:rPr lang="en-US" smtClean="0"/>
-              <a:t>9/23/17</a:t>
+              <a:t>9/26/17</a:t>
             </a:fld>
             <a:endParaRPr lang="en-US"/>
           </a:p>
@@ -2085,7 +2087,7 @@
           <a:p>
             <a:fld id="{B885FAB1-7D4C-834A-BFBE-22EE9308C045}" type="datetimeFigureOut">
               <a:rPr lang="en-US" smtClean="0"/>
-              <a:t>9/23/17</a:t>
+              <a:t>9/26/17</a:t>
             </a:fld>
             <a:endParaRPr lang="en-US"/>
           </a:p>
@@ -2180,7 +2182,7 @@
           <a:p>
             <a:fld id="{B885FAB1-7D4C-834A-BFBE-22EE9308C045}" type="datetimeFigureOut">
               <a:rPr lang="en-US" smtClean="0"/>
-              <a:t>9/23/17</a:t>
+              <a:t>9/26/17</a:t>
             </a:fld>
             <a:endParaRPr lang="en-US"/>
           </a:p>
@@ -2457,7 +2459,7 @@
           <a:p>
             <a:fld id="{B885FAB1-7D4C-834A-BFBE-22EE9308C045}" type="datetimeFigureOut">
               <a:rPr lang="en-US" smtClean="0"/>
-              <a:t>9/23/17</a:t>
+              <a:t>9/26/17</a:t>
             </a:fld>
             <a:endParaRPr lang="en-US"/>
           </a:p>
@@ -2710,7 +2712,7 @@
           <a:p>
             <a:fld id="{B885FAB1-7D4C-834A-BFBE-22EE9308C045}" type="datetimeFigureOut">
               <a:rPr lang="en-US" smtClean="0"/>
-              <a:t>9/23/17</a:t>
+              <a:t>9/26/17</a:t>
             </a:fld>
             <a:endParaRPr lang="en-US"/>
           </a:p>
@@ -2923,7 +2925,7 @@
           <a:p>
             <a:fld id="{B885FAB1-7D4C-834A-BFBE-22EE9308C045}" type="datetimeFigureOut">
               <a:rPr lang="en-US" smtClean="0"/>
-              <a:t>9/23/17</a:t>
+              <a:t>9/26/17</a:t>
             </a:fld>
             <a:endParaRPr lang="en-US"/>
           </a:p>
@@ -3330,36 +3332,6 @@
       </p:grpSpPr>
       <p:sp>
         <p:nvSpPr>
-          <p:cNvPr id="2" name="Title 1"/>
-          <p:cNvSpPr>
-            <a:spLocks noGrp="1"/>
-          </p:cNvSpPr>
-          <p:nvPr>
-            <p:ph type="ctrTitle"/>
-          </p:nvPr>
-        </p:nvSpPr>
-        <p:spPr/>
-        <p:txBody>
-          <a:bodyPr/>
-          <a:lstStyle/>
-          <a:p>
-            <a:r>
-              <a:rPr lang="en-US" dirty="0" smtClean="0"/>
-              <a:t>Juniper Networks </a:t>
-            </a:r>
-            <a:br>
-              <a:rPr lang="en-US" dirty="0" smtClean="0"/>
-            </a:br>
-            <a:r>
-              <a:rPr lang="en-US" dirty="0" smtClean="0"/>
-              <a:t>LAB Presentation</a:t>
-            </a:r>
-            <a:endParaRPr lang="en-US" dirty="0"/>
-          </a:p>
-        </p:txBody>
-      </p:sp>
-      <p:sp>
-        <p:nvSpPr>
           <p:cNvPr id="4" name="Title 1"/>
           <p:cNvSpPr txBox="1">
             <a:spLocks/>
@@ -3368,7 +3340,7 @@
         </p:nvSpPr>
         <p:spPr>
           <a:xfrm>
-            <a:off x="7795966" y="5015059"/>
+            <a:off x="8954678" y="2929484"/>
             <a:ext cx="3161907" cy="388783"/>
           </a:xfrm>
           <a:prstGeom prst="rect">
@@ -3412,10 +3384,505 @@
               <a:t>Email: </a:t>
             </a:r>
             <a:r>
-              <a:rPr lang="en-US" sz="1600" smtClean="0"/>
+              <a:rPr lang="en-US" sz="1600" dirty="0" err="1" smtClean="0"/>
               <a:t>silvique_ms@yahoo.com</a:t>
             </a:r>
             <a:endParaRPr lang="en-US" sz="1600" dirty="0"/>
+          </a:p>
+        </p:txBody>
+      </p:sp>
+      <p:grpSp>
+        <p:nvGrpSpPr>
+          <p:cNvPr id="5" name="Group 4"/>
+          <p:cNvGrpSpPr/>
+          <p:nvPr/>
+        </p:nvGrpSpPr>
+        <p:grpSpPr>
+          <a:xfrm>
+            <a:off x="401263" y="200"/>
+            <a:ext cx="5692425" cy="6879386"/>
+            <a:chOff x="401263" y="200"/>
+            <a:chExt cx="5692425" cy="6879386"/>
+          </a:xfrm>
+        </p:grpSpPr>
+        <p:pic>
+          <p:nvPicPr>
+            <p:cNvPr id="6" name="Picture 5" descr="vMX.png"/>
+            <p:cNvPicPr>
+              <a:picLocks noChangeAspect="1"/>
+            </p:cNvPicPr>
+            <p:nvPr/>
+          </p:nvPicPr>
+          <p:blipFill>
+            <a:blip r:embed="rId2">
+              <a:alphaModFix amt="85000"/>
+              <a:duotone>
+                <a:schemeClr val="accent5">
+                  <a:shade val="45000"/>
+                  <a:satMod val="135000"/>
+                </a:schemeClr>
+                <a:prstClr val="white"/>
+              </a:duotone>
+              <a:extLst>
+                <a:ext uri="{28A0092B-C50C-407E-A947-70E740481C1C}">
+                  <a14:useLocalDpi xmlns:a14="http://schemas.microsoft.com/office/drawing/2010/main" val="0"/>
+                </a:ext>
+              </a:extLst>
+            </a:blip>
+            <a:stretch>
+              <a:fillRect/>
+            </a:stretch>
+          </p:blipFill>
+          <p:spPr>
+            <a:xfrm rot="17019106">
+              <a:off x="3409759" y="2837380"/>
+              <a:ext cx="3397051" cy="1970807"/>
+            </a:xfrm>
+            <a:prstGeom prst="rect">
+              <a:avLst/>
+            </a:prstGeom>
+          </p:spPr>
+        </p:pic>
+        <p:sp>
+          <p:nvSpPr>
+            <p:cNvPr id="7" name="TextBox 6"/>
+            <p:cNvSpPr txBox="1"/>
+            <p:nvPr/>
+          </p:nvSpPr>
+          <p:spPr>
+            <a:xfrm rot="21123822">
+              <a:off x="1550636" y="977959"/>
+              <a:ext cx="3803798" cy="1569660"/>
+            </a:xfrm>
+            <a:prstGeom prst="rect">
+              <a:avLst/>
+            </a:prstGeom>
+            <a:noFill/>
+            <a:ln>
+              <a:noFill/>
+            </a:ln>
+          </p:spPr>
+          <p:txBody>
+            <a:bodyPr wrap="none" rtlCol="0">
+              <a:spAutoFit/>
+            </a:bodyPr>
+            <a:lstStyle/>
+            <a:p>
+              <a:r>
+                <a:rPr lang="en-US" sz="9600" b="1" smtClean="0">
+                  <a:ln cap="rnd">
+                    <a:gradFill>
+                      <a:gsLst>
+                        <a:gs pos="0">
+                          <a:schemeClr val="accent1">
+                            <a:lumMod val="5000"/>
+                            <a:lumOff val="95000"/>
+                          </a:schemeClr>
+                        </a:gs>
+                        <a:gs pos="74000">
+                          <a:schemeClr val="accent1">
+                            <a:lumMod val="45000"/>
+                            <a:lumOff val="55000"/>
+                          </a:schemeClr>
+                        </a:gs>
+                        <a:gs pos="83000">
+                          <a:schemeClr val="accent1">
+                            <a:lumMod val="45000"/>
+                            <a:lumOff val="55000"/>
+                          </a:schemeClr>
+                        </a:gs>
+                        <a:gs pos="100000">
+                          <a:schemeClr val="accent1">
+                            <a:lumMod val="30000"/>
+                            <a:lumOff val="70000"/>
+                          </a:schemeClr>
+                        </a:gs>
+                      </a:gsLst>
+                      <a:lin ang="5400000" scaled="1"/>
+                    </a:gradFill>
+                  </a:ln>
+                  <a:gradFill flip="none" rotWithShape="1">
+                    <a:gsLst>
+                      <a:gs pos="0">
+                        <a:schemeClr val="accent1">
+                          <a:lumMod val="67000"/>
+                        </a:schemeClr>
+                      </a:gs>
+                      <a:gs pos="63000">
+                        <a:schemeClr val="accent5">
+                          <a:lumMod val="60000"/>
+                          <a:lumOff val="40000"/>
+                        </a:schemeClr>
+                      </a:gs>
+                      <a:gs pos="100000">
+                        <a:schemeClr val="accent1">
+                          <a:lumMod val="60000"/>
+                          <a:lumOff val="40000"/>
+                        </a:schemeClr>
+                      </a:gs>
+                    </a:gsLst>
+                    <a:lin ang="15600000" scaled="0"/>
+                    <a:tileRect/>
+                  </a:gradFill>
+                  <a:effectLst>
+                    <a:outerShdw blurRad="50800" dist="50800" dir="5400000" algn="ctr" rotWithShape="0">
+                      <a:schemeClr val="accent5">
+                        <a:lumMod val="40000"/>
+                        <a:lumOff val="60000"/>
+                      </a:schemeClr>
+                    </a:outerShdw>
+                  </a:effectLst>
+                  <a:latin typeface="Cooper Black" charset="0"/>
+                  <a:ea typeface="Cooper Black" charset="0"/>
+                  <a:cs typeface="Cooper Black" charset="0"/>
+                </a:rPr>
+                <a:t>Lifter</a:t>
+              </a:r>
+              <a:endParaRPr lang="en-US" sz="9600" b="1" dirty="0">
+                <a:ln cap="rnd">
+                  <a:gradFill>
+                    <a:gsLst>
+                      <a:gs pos="0">
+                        <a:schemeClr val="accent1">
+                          <a:lumMod val="5000"/>
+                          <a:lumOff val="95000"/>
+                        </a:schemeClr>
+                      </a:gs>
+                      <a:gs pos="74000">
+                        <a:schemeClr val="accent1">
+                          <a:lumMod val="45000"/>
+                          <a:lumOff val="55000"/>
+                        </a:schemeClr>
+                      </a:gs>
+                      <a:gs pos="83000">
+                        <a:schemeClr val="accent1">
+                          <a:lumMod val="45000"/>
+                          <a:lumOff val="55000"/>
+                        </a:schemeClr>
+                      </a:gs>
+                      <a:gs pos="100000">
+                        <a:schemeClr val="accent1">
+                          <a:lumMod val="30000"/>
+                          <a:lumOff val="70000"/>
+                        </a:schemeClr>
+                      </a:gs>
+                    </a:gsLst>
+                    <a:lin ang="5400000" scaled="1"/>
+                  </a:gradFill>
+                </a:ln>
+                <a:gradFill flip="none" rotWithShape="1">
+                  <a:gsLst>
+                    <a:gs pos="0">
+                      <a:schemeClr val="accent1">
+                        <a:lumMod val="67000"/>
+                      </a:schemeClr>
+                    </a:gs>
+                    <a:gs pos="63000">
+                      <a:schemeClr val="accent5">
+                        <a:lumMod val="60000"/>
+                        <a:lumOff val="40000"/>
+                      </a:schemeClr>
+                    </a:gs>
+                    <a:gs pos="100000">
+                      <a:schemeClr val="accent1">
+                        <a:lumMod val="60000"/>
+                        <a:lumOff val="40000"/>
+                      </a:schemeClr>
+                    </a:gs>
+                  </a:gsLst>
+                  <a:lin ang="15600000" scaled="0"/>
+                  <a:tileRect/>
+                </a:gradFill>
+                <a:effectLst>
+                  <a:outerShdw blurRad="50800" dist="50800" dir="5400000" algn="ctr" rotWithShape="0">
+                    <a:schemeClr val="accent5">
+                      <a:lumMod val="40000"/>
+                      <a:lumOff val="60000"/>
+                    </a:schemeClr>
+                  </a:outerShdw>
+                </a:effectLst>
+                <a:latin typeface="Cooper Black" charset="0"/>
+                <a:ea typeface="Cooper Black" charset="0"/>
+                <a:cs typeface="Cooper Black" charset="0"/>
+              </a:endParaRPr>
+            </a:p>
+          </p:txBody>
+        </p:sp>
+        <p:pic>
+          <p:nvPicPr>
+            <p:cNvPr id="8" name="Picture 7"/>
+            <p:cNvPicPr>
+              <a:picLocks noChangeAspect="1"/>
+            </p:cNvPicPr>
+            <p:nvPr/>
+          </p:nvPicPr>
+          <p:blipFill>
+            <a:blip r:embed="rId3">
+              <a:duotone>
+                <a:schemeClr val="accent5">
+                  <a:shade val="45000"/>
+                  <a:satMod val="135000"/>
+                </a:schemeClr>
+                <a:prstClr val="white"/>
+              </a:duotone>
+              <a:extLst>
+                <a:ext uri="{BEBA8EAE-BF5A-486C-A8C5-ECC9F3942E4B}">
+                  <a14:imgProps xmlns:a14="http://schemas.microsoft.com/office/drawing/2010/main">
+                    <a14:imgLayer r:embed="rId4">
+                      <a14:imgEffect>
+                        <a14:colorTemperature colorTemp="8510"/>
+                      </a14:imgEffect>
+                      <a14:imgEffect>
+                        <a14:saturation sat="242000"/>
+                      </a14:imgEffect>
+                    </a14:imgLayer>
+                  </a14:imgProps>
+                </a:ext>
+                <a:ext uri="{28A0092B-C50C-407E-A947-70E740481C1C}">
+                  <a14:useLocalDpi xmlns:a14="http://schemas.microsoft.com/office/drawing/2010/main" val="0"/>
+                </a:ext>
+              </a:extLst>
+            </a:blip>
+            <a:stretch>
+              <a:fillRect/>
+            </a:stretch>
+          </p:blipFill>
+          <p:spPr>
+            <a:xfrm>
+              <a:off x="3347872" y="5942621"/>
+              <a:ext cx="936965" cy="936965"/>
+            </a:xfrm>
+            <a:prstGeom prst="rect">
+              <a:avLst/>
+            </a:prstGeom>
+            <a:effectLst/>
+          </p:spPr>
+        </p:pic>
+        <p:pic>
+          <p:nvPicPr>
+            <p:cNvPr id="9" name="Picture 8"/>
+            <p:cNvPicPr>
+              <a:picLocks noChangeAspect="1"/>
+            </p:cNvPicPr>
+            <p:nvPr/>
+          </p:nvPicPr>
+          <p:blipFill>
+            <a:blip r:embed="rId5">
+              <a:alphaModFix amt="61000"/>
+              <a:grayscl/>
+              <a:extLst>
+                <a:ext uri="{28A0092B-C50C-407E-A947-70E740481C1C}">
+                  <a14:useLocalDpi xmlns:a14="http://schemas.microsoft.com/office/drawing/2010/main" val="0"/>
+                </a:ext>
+              </a:extLst>
+            </a:blip>
+            <a:stretch>
+              <a:fillRect/>
+            </a:stretch>
+          </p:blipFill>
+          <p:spPr>
+            <a:xfrm>
+              <a:off x="401263" y="629821"/>
+              <a:ext cx="4064000" cy="5638800"/>
+            </a:xfrm>
+            <a:prstGeom prst="rect">
+              <a:avLst/>
+            </a:prstGeom>
+          </p:spPr>
+        </p:pic>
+        <p:sp>
+          <p:nvSpPr>
+            <p:cNvPr id="10" name="TextBox 9"/>
+            <p:cNvSpPr txBox="1"/>
+            <p:nvPr/>
+          </p:nvSpPr>
+          <p:spPr>
+            <a:xfrm rot="563424">
+              <a:off x="1422887" y="200"/>
+              <a:ext cx="2645276" cy="1569660"/>
+            </a:xfrm>
+            <a:prstGeom prst="rect">
+              <a:avLst/>
+            </a:prstGeom>
+            <a:noFill/>
+            <a:ln>
+              <a:noFill/>
+            </a:ln>
+          </p:spPr>
+          <p:txBody>
+            <a:bodyPr wrap="none" rtlCol="0">
+              <a:spAutoFit/>
+            </a:bodyPr>
+            <a:lstStyle/>
+            <a:p>
+              <a:r>
+                <a:rPr lang="en-US" sz="9600" b="1" dirty="0" smtClean="0">
+                  <a:ln cap="rnd">
+                    <a:gradFill>
+                      <a:gsLst>
+                        <a:gs pos="0">
+                          <a:schemeClr val="accent1">
+                            <a:lumMod val="5000"/>
+                            <a:lumOff val="95000"/>
+                          </a:schemeClr>
+                        </a:gs>
+                        <a:gs pos="74000">
+                          <a:schemeClr val="accent1">
+                            <a:lumMod val="45000"/>
+                            <a:lumOff val="55000"/>
+                          </a:schemeClr>
+                        </a:gs>
+                        <a:gs pos="83000">
+                          <a:schemeClr val="accent1">
+                            <a:lumMod val="45000"/>
+                            <a:lumOff val="55000"/>
+                          </a:schemeClr>
+                        </a:gs>
+                        <a:gs pos="100000">
+                          <a:schemeClr val="accent1">
+                            <a:lumMod val="30000"/>
+                            <a:lumOff val="70000"/>
+                          </a:schemeClr>
+                        </a:gs>
+                      </a:gsLst>
+                      <a:lin ang="5400000" scaled="1"/>
+                    </a:gradFill>
+                  </a:ln>
+                  <a:gradFill flip="none" rotWithShape="1">
+                    <a:gsLst>
+                      <a:gs pos="0">
+                        <a:schemeClr val="accent1">
+                          <a:lumMod val="67000"/>
+                        </a:schemeClr>
+                      </a:gs>
+                      <a:gs pos="63000">
+                        <a:schemeClr val="accent5">
+                          <a:lumMod val="60000"/>
+                          <a:lumOff val="40000"/>
+                        </a:schemeClr>
+                      </a:gs>
+                      <a:gs pos="100000">
+                        <a:schemeClr val="accent1">
+                          <a:lumMod val="60000"/>
+                          <a:lumOff val="40000"/>
+                        </a:schemeClr>
+                      </a:gs>
+                    </a:gsLst>
+                    <a:lin ang="15600000" scaled="0"/>
+                    <a:tileRect/>
+                  </a:gradFill>
+                  <a:effectLst>
+                    <a:outerShdw blurRad="50800" dist="50800" dir="5400000" algn="ctr" rotWithShape="0">
+                      <a:schemeClr val="accent5">
+                        <a:lumMod val="40000"/>
+                        <a:lumOff val="60000"/>
+                      </a:schemeClr>
+                    </a:outerShdw>
+                  </a:effectLst>
+                  <a:latin typeface="Cooper Black" charset="0"/>
+                  <a:ea typeface="Cooper Black" charset="0"/>
+                  <a:cs typeface="Cooper Black" charset="0"/>
+                </a:rPr>
+                <a:t>Sky</a:t>
+              </a:r>
+              <a:endParaRPr lang="en-US" sz="9600" b="1" dirty="0">
+                <a:ln cap="rnd">
+                  <a:gradFill>
+                    <a:gsLst>
+                      <a:gs pos="0">
+                        <a:schemeClr val="accent1">
+                          <a:lumMod val="5000"/>
+                          <a:lumOff val="95000"/>
+                        </a:schemeClr>
+                      </a:gs>
+                      <a:gs pos="74000">
+                        <a:schemeClr val="accent1">
+                          <a:lumMod val="45000"/>
+                          <a:lumOff val="55000"/>
+                        </a:schemeClr>
+                      </a:gs>
+                      <a:gs pos="83000">
+                        <a:schemeClr val="accent1">
+                          <a:lumMod val="45000"/>
+                          <a:lumOff val="55000"/>
+                        </a:schemeClr>
+                      </a:gs>
+                      <a:gs pos="100000">
+                        <a:schemeClr val="accent1">
+                          <a:lumMod val="30000"/>
+                          <a:lumOff val="70000"/>
+                        </a:schemeClr>
+                      </a:gs>
+                    </a:gsLst>
+                    <a:lin ang="5400000" scaled="1"/>
+                  </a:gradFill>
+                </a:ln>
+                <a:gradFill flip="none" rotWithShape="1">
+                  <a:gsLst>
+                    <a:gs pos="0">
+                      <a:schemeClr val="accent1">
+                        <a:lumMod val="67000"/>
+                      </a:schemeClr>
+                    </a:gs>
+                    <a:gs pos="63000">
+                      <a:schemeClr val="accent5">
+                        <a:lumMod val="60000"/>
+                        <a:lumOff val="40000"/>
+                      </a:schemeClr>
+                    </a:gs>
+                    <a:gs pos="100000">
+                      <a:schemeClr val="accent1">
+                        <a:lumMod val="60000"/>
+                        <a:lumOff val="40000"/>
+                      </a:schemeClr>
+                    </a:gs>
+                  </a:gsLst>
+                  <a:lin ang="15600000" scaled="0"/>
+                  <a:tileRect/>
+                </a:gradFill>
+                <a:effectLst>
+                  <a:outerShdw blurRad="50800" dist="50800" dir="5400000" algn="ctr" rotWithShape="0">
+                    <a:schemeClr val="accent5">
+                      <a:lumMod val="40000"/>
+                      <a:lumOff val="60000"/>
+                    </a:schemeClr>
+                  </a:outerShdw>
+                </a:effectLst>
+                <a:latin typeface="Cooper Black" charset="0"/>
+                <a:ea typeface="Cooper Black" charset="0"/>
+                <a:cs typeface="Cooper Black" charset="0"/>
+              </a:endParaRPr>
+            </a:p>
+          </p:txBody>
+        </p:sp>
+      </p:grpSp>
+      <p:sp>
+        <p:nvSpPr>
+          <p:cNvPr id="11" name="TextBox 10"/>
+          <p:cNvSpPr txBox="1"/>
+          <p:nvPr/>
+        </p:nvSpPr>
+        <p:spPr>
+          <a:xfrm>
+            <a:off x="6823839" y="1347290"/>
+            <a:ext cx="5390963" cy="830997"/>
+          </a:xfrm>
+          <a:prstGeom prst="rect">
+            <a:avLst/>
+          </a:prstGeom>
+          <a:noFill/>
+        </p:spPr>
+        <p:txBody>
+          <a:bodyPr wrap="none" rtlCol="0">
+            <a:spAutoFit/>
+          </a:bodyPr>
+          <a:lstStyle/>
+          <a:p>
+            <a:r>
+              <a:rPr lang="en-US" sz="4800" b="1" dirty="0" smtClean="0"/>
+              <a:t>Project Presentation</a:t>
+            </a:r>
+            <a:endParaRPr lang="en-US" sz="4800" b="1" dirty="0"/>
           </a:p>
         </p:txBody>
       </p:sp>
@@ -3429,6 +3896,13 @@
   <p:clrMapOvr>
     <a:masterClrMapping/>
   </p:clrMapOvr>
+  <p:timing>
+    <p:tnLst>
+      <p:par>
+        <p:cTn id="1" dur="indefinite" restart="never" nodeType="tmRoot"/>
+      </p:par>
+    </p:tnLst>
+  </p:timing>
 </p:sld>
 </file>
 
@@ -4626,7 +5100,9 @@
           </a:gradFill>
         </p:spPr>
         <p:txBody>
-          <a:bodyPr/>
+          <a:bodyPr>
+            <a:normAutofit lnSpcReduction="10000"/>
+          </a:bodyPr>
           <a:lstStyle/>
           <a:p>
             <a:pPr marL="0" indent="0">
@@ -4737,7 +5213,46 @@
             </a:pPr>
             <a:r>
               <a:rPr lang="en-US" sz="1800" dirty="0" smtClean="0"/>
-              <a:t>Python 2.7.13</a:t>
+              <a:t>Python </a:t>
+            </a:r>
+            <a:r>
+              <a:rPr lang="en-US" sz="1800" dirty="0" smtClean="0"/>
+              <a:t>2.7.13 </a:t>
+            </a:r>
+            <a:r>
+              <a:rPr lang="mr-IN" sz="1800" dirty="0" smtClean="0"/>
+              <a:t>–</a:t>
+            </a:r>
+            <a:r>
+              <a:rPr lang="en-US" sz="1800" dirty="0" smtClean="0"/>
+              <a:t> </a:t>
+            </a:r>
+            <a:r>
+              <a:rPr lang="en-US" sz="1800" dirty="0" err="1" smtClean="0"/>
+              <a:t>PyEZ</a:t>
+            </a:r>
+            <a:r>
+              <a:rPr lang="en-US" sz="1800" dirty="0" smtClean="0"/>
+              <a:t>, </a:t>
+            </a:r>
+            <a:r>
+              <a:rPr lang="en-US" sz="1800" dirty="0" err="1" smtClean="0"/>
+              <a:t>JSNAPy</a:t>
+            </a:r>
+            <a:endParaRPr lang="en-US" sz="1800" dirty="0" smtClean="0"/>
+          </a:p>
+          <a:p>
+            <a:pPr>
+              <a:buFontTx/>
+              <a:buChar char="-"/>
+            </a:pPr>
+            <a:r>
+              <a:rPr lang="en-US" sz="1800" dirty="0" err="1" smtClean="0"/>
+              <a:t>Git</a:t>
+            </a:r>
+            <a:r>
+              <a:rPr lang="en-US" sz="1800" dirty="0" smtClean="0"/>
+              <a:t> &amp; GitHub</a:t>
             </a:r>
             <a:endParaRPr lang="mr-IN" sz="1800" dirty="0"/>
           </a:p>
@@ -4817,67 +5332,112 @@
           </a:extLst>
         </p:spPr>
       </p:pic>
-      <p:sp>
-        <p:nvSpPr>
-          <p:cNvPr id="135" name="Title 1"/>
-          <p:cNvSpPr txBox="1">
-            <a:spLocks/>
-          </p:cNvSpPr>
-          <p:nvPr/>
-        </p:nvSpPr>
-        <p:spPr>
-          <a:xfrm>
-            <a:off x="9143088" y="6305904"/>
-            <a:ext cx="3161907" cy="388783"/>
-          </a:xfrm>
-          <a:prstGeom prst="rect">
-            <a:avLst/>
-          </a:prstGeom>
-        </p:spPr>
-        <p:txBody>
-          <a:bodyPr vert="horz" lIns="91440" tIns="45720" rIns="91440" bIns="45720" rtlCol="0" anchor="b">
-            <a:noAutofit/>
-          </a:bodyPr>
-          <a:lstStyle>
-            <a:lvl1pPr algn="ctr" defTabSz="914400" rtl="0" eaLnBrk="1" latinLnBrk="0" hangingPunct="1">
-              <a:lnSpc>
-                <a:spcPct val="90000"/>
-              </a:lnSpc>
-              <a:spcBef>
-                <a:spcPct val="0"/>
-              </a:spcBef>
-              <a:buNone/>
-              <a:defRPr sz="6000" kern="1200">
-                <a:solidFill>
-                  <a:schemeClr val="tx1"/>
-                </a:solidFill>
-                <a:latin typeface="+mj-lt"/>
-                <a:ea typeface="+mj-ea"/>
-                <a:cs typeface="+mj-cs"/>
-              </a:defRPr>
-            </a:lvl1pPr>
-          </a:lstStyle>
-          <a:p>
-            <a:pPr algn="l"/>
-            <a:r>
-              <a:rPr lang="en-US" sz="1600" b="1" dirty="0" smtClean="0"/>
-              <a:t>Silvia Murgescu</a:t>
-            </a:r>
-          </a:p>
-          <a:p>
-            <a:pPr algn="l"/>
-            <a:r>
-              <a:rPr lang="en-US" sz="1600" dirty="0" smtClean="0"/>
-              <a:t>Email: </a:t>
-            </a:r>
-            <a:r>
-              <a:rPr lang="en-US" sz="1600" smtClean="0"/>
-              <a:t>silvique_ms@yahoo.com</a:t>
-            </a:r>
-            <a:endParaRPr lang="en-US" sz="1600" dirty="0"/>
-          </a:p>
-        </p:txBody>
-      </p:sp>
+      <p:grpSp>
+        <p:nvGrpSpPr>
+          <p:cNvPr id="3" name="Group 2"/>
+          <p:cNvGrpSpPr/>
+          <p:nvPr/>
+        </p:nvGrpSpPr>
+        <p:grpSpPr>
+          <a:xfrm>
+            <a:off x="8862369" y="6154379"/>
+            <a:ext cx="3442626" cy="703621"/>
+            <a:chOff x="8862369" y="6154379"/>
+            <a:chExt cx="3442626" cy="703621"/>
+          </a:xfrm>
+        </p:grpSpPr>
+        <p:pic>
+          <p:nvPicPr>
+            <p:cNvPr id="33" name="Picture 32"/>
+            <p:cNvPicPr>
+              <a:picLocks noChangeAspect="1"/>
+            </p:cNvPicPr>
+            <p:nvPr/>
+          </p:nvPicPr>
+          <p:blipFill>
+            <a:blip r:embed="rId13">
+              <a:extLst>
+                <a:ext uri="{28A0092B-C50C-407E-A947-70E740481C1C}">
+                  <a14:useLocalDpi xmlns:a14="http://schemas.microsoft.com/office/drawing/2010/main" val="0"/>
+                </a:ext>
+              </a:extLst>
+            </a:blip>
+            <a:stretch>
+              <a:fillRect/>
+            </a:stretch>
+          </p:blipFill>
+          <p:spPr>
+            <a:xfrm>
+              <a:off x="8862369" y="6154379"/>
+              <a:ext cx="3329631" cy="703621"/>
+            </a:xfrm>
+            <a:prstGeom prst="rect">
+              <a:avLst/>
+            </a:prstGeom>
+          </p:spPr>
+        </p:pic>
+        <p:sp>
+          <p:nvSpPr>
+            <p:cNvPr id="135" name="Title 1"/>
+            <p:cNvSpPr txBox="1">
+              <a:spLocks/>
+            </p:cNvSpPr>
+            <p:nvPr/>
+          </p:nvSpPr>
+          <p:spPr>
+            <a:xfrm>
+              <a:off x="9143088" y="6305904"/>
+              <a:ext cx="3161907" cy="388783"/>
+            </a:xfrm>
+            <a:prstGeom prst="rect">
+              <a:avLst/>
+            </a:prstGeom>
+          </p:spPr>
+          <p:txBody>
+            <a:bodyPr vert="horz" lIns="91440" tIns="45720" rIns="91440" bIns="45720" rtlCol="0" anchor="b">
+              <a:noAutofit/>
+            </a:bodyPr>
+            <a:lstStyle>
+              <a:lvl1pPr algn="ctr" defTabSz="914400" rtl="0" eaLnBrk="1" latinLnBrk="0" hangingPunct="1">
+                <a:lnSpc>
+                  <a:spcPct val="90000"/>
+                </a:lnSpc>
+                <a:spcBef>
+                  <a:spcPct val="0"/>
+                </a:spcBef>
+                <a:buNone/>
+                <a:defRPr sz="6000" kern="1200">
+                  <a:solidFill>
+                    <a:schemeClr val="tx1"/>
+                  </a:solidFill>
+                  <a:latin typeface="+mj-lt"/>
+                  <a:ea typeface="+mj-ea"/>
+                  <a:cs typeface="+mj-cs"/>
+                </a:defRPr>
+              </a:lvl1pPr>
+            </a:lstStyle>
+            <a:p>
+              <a:pPr algn="l"/>
+              <a:r>
+                <a:rPr lang="en-US" sz="1600" b="1" dirty="0" smtClean="0"/>
+                <a:t>Silvia Murgescu</a:t>
+              </a:r>
+            </a:p>
+            <a:p>
+              <a:pPr algn="l"/>
+              <a:r>
+                <a:rPr lang="en-US" sz="1600" dirty="0" smtClean="0"/>
+                <a:t>Email: </a:t>
+              </a:r>
+              <a:r>
+                <a:rPr lang="en-US" sz="1600" dirty="0" err="1" smtClean="0"/>
+                <a:t>silvique_ms@yahoo.com</a:t>
+              </a:r>
+              <a:endParaRPr lang="en-US" sz="1600" dirty="0"/>
+            </a:p>
+          </p:txBody>
+        </p:sp>
+      </p:grpSp>
     </p:spTree>
     <p:extLst>
       <p:ext uri="{BB962C8B-B14F-4D97-AF65-F5344CB8AC3E}">
@@ -4888,6 +5448,13 @@
   <p:clrMapOvr>
     <a:masterClrMapping/>
   </p:clrMapOvr>
+  <p:timing>
+    <p:tnLst>
+      <p:par>
+        <p:cTn id="1" dur="indefinite" restart="never" nodeType="tmRoot"/>
+      </p:par>
+    </p:tnLst>
+  </p:timing>
 </p:sld>
 </file>
 
@@ -7616,63 +8183,112 @@
           </a:prstGeom>
         </p:spPr>
       </p:pic>
-      <p:sp>
-        <p:nvSpPr>
-          <p:cNvPr id="69" name="Title 1"/>
-          <p:cNvSpPr txBox="1">
-            <a:spLocks/>
-          </p:cNvSpPr>
-          <p:nvPr/>
-        </p:nvSpPr>
-        <p:spPr>
-          <a:xfrm>
-            <a:off x="9358362" y="6406173"/>
-            <a:ext cx="3161907" cy="388783"/>
-          </a:xfrm>
-          <a:prstGeom prst="rect">
-            <a:avLst/>
-          </a:prstGeom>
-        </p:spPr>
-        <p:txBody>
-          <a:bodyPr vert="horz" lIns="91440" tIns="45720" rIns="91440" bIns="45720" rtlCol="0" anchor="b">
-            <a:noAutofit/>
-          </a:bodyPr>
-          <a:lstStyle>
-            <a:lvl1pPr algn="ctr" defTabSz="914400" rtl="0" eaLnBrk="1" latinLnBrk="0" hangingPunct="1">
-              <a:lnSpc>
-                <a:spcPct val="90000"/>
-              </a:lnSpc>
-              <a:spcBef>
-                <a:spcPct val="0"/>
-              </a:spcBef>
-              <a:buNone/>
-              <a:defRPr sz="6000" kern="1200">
-                <a:solidFill>
-                  <a:schemeClr val="tx1"/>
-                </a:solidFill>
-                <a:latin typeface="+mj-lt"/>
-                <a:ea typeface="+mj-ea"/>
-                <a:cs typeface="+mj-cs"/>
-              </a:defRPr>
-            </a:lvl1pPr>
-          </a:lstStyle>
-          <a:p>
-            <a:pPr algn="l"/>
-            <a:r>
-              <a:rPr lang="en-US" sz="1600" b="1" dirty="0" smtClean="0"/>
-              <a:t>Silvia Murgescu</a:t>
-            </a:r>
-          </a:p>
-          <a:p>
-            <a:pPr algn="l"/>
-            <a:r>
-              <a:rPr lang="en-US" sz="1600" dirty="0" smtClean="0"/>
-              <a:t>Email: silvique_ms@yahoo.com</a:t>
-            </a:r>
-            <a:endParaRPr lang="en-US" sz="1600" dirty="0"/>
-          </a:p>
-        </p:txBody>
-      </p:sp>
+      <p:grpSp>
+        <p:nvGrpSpPr>
+          <p:cNvPr id="64" name="Group 63"/>
+          <p:cNvGrpSpPr/>
+          <p:nvPr/>
+        </p:nvGrpSpPr>
+        <p:grpSpPr>
+          <a:xfrm>
+            <a:off x="8862369" y="6154379"/>
+            <a:ext cx="3442626" cy="703621"/>
+            <a:chOff x="8862369" y="6154379"/>
+            <a:chExt cx="3442626" cy="703621"/>
+          </a:xfrm>
+        </p:grpSpPr>
+        <p:pic>
+          <p:nvPicPr>
+            <p:cNvPr id="66" name="Picture 65"/>
+            <p:cNvPicPr>
+              <a:picLocks noChangeAspect="1"/>
+            </p:cNvPicPr>
+            <p:nvPr/>
+          </p:nvPicPr>
+          <p:blipFill>
+            <a:blip r:embed="rId18">
+              <a:extLst>
+                <a:ext uri="{28A0092B-C50C-407E-A947-70E740481C1C}">
+                  <a14:useLocalDpi xmlns:a14="http://schemas.microsoft.com/office/drawing/2010/main" val="0"/>
+                </a:ext>
+              </a:extLst>
+            </a:blip>
+            <a:stretch>
+              <a:fillRect/>
+            </a:stretch>
+          </p:blipFill>
+          <p:spPr>
+            <a:xfrm>
+              <a:off x="8862369" y="6154379"/>
+              <a:ext cx="3329631" cy="703621"/>
+            </a:xfrm>
+            <a:prstGeom prst="rect">
+              <a:avLst/>
+            </a:prstGeom>
+          </p:spPr>
+        </p:pic>
+        <p:sp>
+          <p:nvSpPr>
+            <p:cNvPr id="68" name="Title 1"/>
+            <p:cNvSpPr txBox="1">
+              <a:spLocks/>
+            </p:cNvSpPr>
+            <p:nvPr/>
+          </p:nvSpPr>
+          <p:spPr>
+            <a:xfrm>
+              <a:off x="9143088" y="6305904"/>
+              <a:ext cx="3161907" cy="388783"/>
+            </a:xfrm>
+            <a:prstGeom prst="rect">
+              <a:avLst/>
+            </a:prstGeom>
+          </p:spPr>
+          <p:txBody>
+            <a:bodyPr vert="horz" lIns="91440" tIns="45720" rIns="91440" bIns="45720" rtlCol="0" anchor="b">
+              <a:noAutofit/>
+            </a:bodyPr>
+            <a:lstStyle>
+              <a:lvl1pPr algn="ctr" defTabSz="914400" rtl="0" eaLnBrk="1" latinLnBrk="0" hangingPunct="1">
+                <a:lnSpc>
+                  <a:spcPct val="90000"/>
+                </a:lnSpc>
+                <a:spcBef>
+                  <a:spcPct val="0"/>
+                </a:spcBef>
+                <a:buNone/>
+                <a:defRPr sz="6000" kern="1200">
+                  <a:solidFill>
+                    <a:schemeClr val="tx1"/>
+                  </a:solidFill>
+                  <a:latin typeface="+mj-lt"/>
+                  <a:ea typeface="+mj-ea"/>
+                  <a:cs typeface="+mj-cs"/>
+                </a:defRPr>
+              </a:lvl1pPr>
+            </a:lstStyle>
+            <a:p>
+              <a:pPr algn="l"/>
+              <a:r>
+                <a:rPr lang="en-US" sz="1600" b="1" dirty="0" smtClean="0"/>
+                <a:t>Silvia Murgescu</a:t>
+              </a:r>
+            </a:p>
+            <a:p>
+              <a:pPr algn="l"/>
+              <a:r>
+                <a:rPr lang="en-US" sz="1600" dirty="0" smtClean="0"/>
+                <a:t>Email: </a:t>
+              </a:r>
+              <a:r>
+                <a:rPr lang="en-US" sz="1600" dirty="0" err="1" smtClean="0"/>
+                <a:t>silvique_ms@yahoo.com</a:t>
+              </a:r>
+              <a:endParaRPr lang="en-US" sz="1600" dirty="0"/>
+            </a:p>
+          </p:txBody>
+        </p:sp>
+      </p:grpSp>
     </p:spTree>
     <p:extLst>
       <p:ext uri="{BB962C8B-B14F-4D97-AF65-F5344CB8AC3E}">
@@ -7683,6 +8299,13 @@
   <p:clrMapOvr>
     <a:masterClrMapping/>
   </p:clrMapOvr>
+  <p:timing>
+    <p:tnLst>
+      <p:par>
+        <p:cTn id="1" dur="indefinite" restart="never" nodeType="tmRoot"/>
+      </p:par>
+    </p:tnLst>
+  </p:timing>
 </p:sld>
 </file>
 
@@ -10709,63 +11332,112 @@
           </a:prstGeom>
         </p:spPr>
       </p:pic>
-      <p:sp>
-        <p:nvSpPr>
-          <p:cNvPr id="132" name="Title 1"/>
-          <p:cNvSpPr txBox="1">
-            <a:spLocks/>
-          </p:cNvSpPr>
-          <p:nvPr/>
-        </p:nvSpPr>
-        <p:spPr>
-          <a:xfrm>
-            <a:off x="9338686" y="6414202"/>
-            <a:ext cx="3161907" cy="388783"/>
-          </a:xfrm>
-          <a:prstGeom prst="rect">
-            <a:avLst/>
-          </a:prstGeom>
-        </p:spPr>
-        <p:txBody>
-          <a:bodyPr vert="horz" lIns="91440" tIns="45720" rIns="91440" bIns="45720" rtlCol="0" anchor="b">
-            <a:noAutofit/>
-          </a:bodyPr>
-          <a:lstStyle>
-            <a:lvl1pPr algn="ctr" defTabSz="914400" rtl="0" eaLnBrk="1" latinLnBrk="0" hangingPunct="1">
-              <a:lnSpc>
-                <a:spcPct val="90000"/>
-              </a:lnSpc>
-              <a:spcBef>
-                <a:spcPct val="0"/>
-              </a:spcBef>
-              <a:buNone/>
-              <a:defRPr sz="6000" kern="1200">
-                <a:solidFill>
-                  <a:schemeClr val="tx1"/>
-                </a:solidFill>
-                <a:latin typeface="+mj-lt"/>
-                <a:ea typeface="+mj-ea"/>
-                <a:cs typeface="+mj-cs"/>
-              </a:defRPr>
-            </a:lvl1pPr>
-          </a:lstStyle>
-          <a:p>
-            <a:pPr algn="l"/>
-            <a:r>
-              <a:rPr lang="en-US" sz="1600" b="1" dirty="0" smtClean="0"/>
-              <a:t>Silvia Murgescu</a:t>
-            </a:r>
-          </a:p>
-          <a:p>
-            <a:pPr algn="l"/>
-            <a:r>
-              <a:rPr lang="en-US" sz="1600" dirty="0" smtClean="0"/>
-              <a:t>Email: silvique_ms@yahoo.com</a:t>
-            </a:r>
-            <a:endParaRPr lang="en-US" sz="1600" dirty="0"/>
-          </a:p>
-        </p:txBody>
-      </p:sp>
+      <p:grpSp>
+        <p:nvGrpSpPr>
+          <p:cNvPr id="77" name="Group 76"/>
+          <p:cNvGrpSpPr/>
+          <p:nvPr/>
+        </p:nvGrpSpPr>
+        <p:grpSpPr>
+          <a:xfrm>
+            <a:off x="8862369" y="6154379"/>
+            <a:ext cx="3442626" cy="703621"/>
+            <a:chOff x="8862369" y="6154379"/>
+            <a:chExt cx="3442626" cy="703621"/>
+          </a:xfrm>
+        </p:grpSpPr>
+        <p:pic>
+          <p:nvPicPr>
+            <p:cNvPr id="80" name="Picture 79"/>
+            <p:cNvPicPr>
+              <a:picLocks noChangeAspect="1"/>
+            </p:cNvPicPr>
+            <p:nvPr/>
+          </p:nvPicPr>
+          <p:blipFill>
+            <a:blip r:embed="rId8">
+              <a:extLst>
+                <a:ext uri="{28A0092B-C50C-407E-A947-70E740481C1C}">
+                  <a14:useLocalDpi xmlns:a14="http://schemas.microsoft.com/office/drawing/2010/main" val="0"/>
+                </a:ext>
+              </a:extLst>
+            </a:blip>
+            <a:stretch>
+              <a:fillRect/>
+            </a:stretch>
+          </p:blipFill>
+          <p:spPr>
+            <a:xfrm>
+              <a:off x="8862369" y="6154379"/>
+              <a:ext cx="3329631" cy="703621"/>
+            </a:xfrm>
+            <a:prstGeom prst="rect">
+              <a:avLst/>
+            </a:prstGeom>
+          </p:spPr>
+        </p:pic>
+        <p:sp>
+          <p:nvSpPr>
+            <p:cNvPr id="81" name="Title 1"/>
+            <p:cNvSpPr txBox="1">
+              <a:spLocks/>
+            </p:cNvSpPr>
+            <p:nvPr/>
+          </p:nvSpPr>
+          <p:spPr>
+            <a:xfrm>
+              <a:off x="9143088" y="6305904"/>
+              <a:ext cx="3161907" cy="388783"/>
+            </a:xfrm>
+            <a:prstGeom prst="rect">
+              <a:avLst/>
+            </a:prstGeom>
+          </p:spPr>
+          <p:txBody>
+            <a:bodyPr vert="horz" lIns="91440" tIns="45720" rIns="91440" bIns="45720" rtlCol="0" anchor="b">
+              <a:noAutofit/>
+            </a:bodyPr>
+            <a:lstStyle>
+              <a:lvl1pPr algn="ctr" defTabSz="914400" rtl="0" eaLnBrk="1" latinLnBrk="0" hangingPunct="1">
+                <a:lnSpc>
+                  <a:spcPct val="90000"/>
+                </a:lnSpc>
+                <a:spcBef>
+                  <a:spcPct val="0"/>
+                </a:spcBef>
+                <a:buNone/>
+                <a:defRPr sz="6000" kern="1200">
+                  <a:solidFill>
+                    <a:schemeClr val="tx1"/>
+                  </a:solidFill>
+                  <a:latin typeface="+mj-lt"/>
+                  <a:ea typeface="+mj-ea"/>
+                  <a:cs typeface="+mj-cs"/>
+                </a:defRPr>
+              </a:lvl1pPr>
+            </a:lstStyle>
+            <a:p>
+              <a:pPr algn="l"/>
+              <a:r>
+                <a:rPr lang="en-US" sz="1600" b="1" dirty="0" smtClean="0"/>
+                <a:t>Silvia Murgescu</a:t>
+              </a:r>
+            </a:p>
+            <a:p>
+              <a:pPr algn="l"/>
+              <a:r>
+                <a:rPr lang="en-US" sz="1600" dirty="0" smtClean="0"/>
+                <a:t>Email: </a:t>
+              </a:r>
+              <a:r>
+                <a:rPr lang="en-US" sz="1600" dirty="0" err="1" smtClean="0"/>
+                <a:t>silvique_ms@yahoo.com</a:t>
+              </a:r>
+              <a:endParaRPr lang="en-US" sz="1600" dirty="0"/>
+            </a:p>
+          </p:txBody>
+        </p:sp>
+      </p:grpSp>
     </p:spTree>
     <p:extLst>
       <p:ext uri="{BB962C8B-B14F-4D97-AF65-F5344CB8AC3E}">
@@ -10776,6 +11448,13 @@
   <p:clrMapOvr>
     <a:masterClrMapping/>
   </p:clrMapOvr>
+  <p:timing>
+    <p:tnLst>
+      <p:par>
+        <p:cTn id="1" dur="indefinite" restart="never" nodeType="tmRoot"/>
+      </p:par>
+    </p:tnLst>
+  </p:timing>
 </p:sld>
 </file>
 
@@ -11001,63 +11680,112 @@
           </a:prstGeom>
         </p:spPr>
       </p:pic>
-      <p:sp>
-        <p:nvSpPr>
-          <p:cNvPr id="6" name="Title 1"/>
-          <p:cNvSpPr txBox="1">
-            <a:spLocks/>
-          </p:cNvSpPr>
-          <p:nvPr/>
-        </p:nvSpPr>
-        <p:spPr>
-          <a:xfrm>
-            <a:off x="9358362" y="6406173"/>
-            <a:ext cx="3161907" cy="388783"/>
-          </a:xfrm>
-          <a:prstGeom prst="rect">
-            <a:avLst/>
-          </a:prstGeom>
-        </p:spPr>
-        <p:txBody>
-          <a:bodyPr vert="horz" lIns="91440" tIns="45720" rIns="91440" bIns="45720" rtlCol="0" anchor="b">
-            <a:noAutofit/>
-          </a:bodyPr>
-          <a:lstStyle>
-            <a:lvl1pPr algn="ctr" defTabSz="914400" rtl="0" eaLnBrk="1" latinLnBrk="0" hangingPunct="1">
-              <a:lnSpc>
-                <a:spcPct val="90000"/>
-              </a:lnSpc>
-              <a:spcBef>
-                <a:spcPct val="0"/>
-              </a:spcBef>
-              <a:buNone/>
-              <a:defRPr sz="6000" kern="1200">
-                <a:solidFill>
-                  <a:schemeClr val="tx1"/>
-                </a:solidFill>
-                <a:latin typeface="+mj-lt"/>
-                <a:ea typeface="+mj-ea"/>
-                <a:cs typeface="+mj-cs"/>
-              </a:defRPr>
-            </a:lvl1pPr>
-          </a:lstStyle>
-          <a:p>
-            <a:pPr algn="l"/>
-            <a:r>
-              <a:rPr lang="en-US" sz="1600" b="1" dirty="0" smtClean="0"/>
-              <a:t>Silvia Murgescu</a:t>
-            </a:r>
-          </a:p>
-          <a:p>
-            <a:pPr algn="l"/>
-            <a:r>
-              <a:rPr lang="en-US" sz="1600" dirty="0" smtClean="0"/>
-              <a:t>Email: silvique_ms@yahoo.com</a:t>
-            </a:r>
-            <a:endParaRPr lang="en-US" sz="1600" dirty="0"/>
-          </a:p>
-        </p:txBody>
-      </p:sp>
+      <p:grpSp>
+        <p:nvGrpSpPr>
+          <p:cNvPr id="7" name="Group 6"/>
+          <p:cNvGrpSpPr/>
+          <p:nvPr/>
+        </p:nvGrpSpPr>
+        <p:grpSpPr>
+          <a:xfrm>
+            <a:off x="8862369" y="6154379"/>
+            <a:ext cx="3442626" cy="703621"/>
+            <a:chOff x="8862369" y="6154379"/>
+            <a:chExt cx="3442626" cy="703621"/>
+          </a:xfrm>
+        </p:grpSpPr>
+        <p:pic>
+          <p:nvPicPr>
+            <p:cNvPr id="8" name="Picture 7"/>
+            <p:cNvPicPr>
+              <a:picLocks noChangeAspect="1"/>
+            </p:cNvPicPr>
+            <p:nvPr/>
+          </p:nvPicPr>
+          <p:blipFill>
+            <a:blip r:embed="rId3">
+              <a:extLst>
+                <a:ext uri="{28A0092B-C50C-407E-A947-70E740481C1C}">
+                  <a14:useLocalDpi xmlns:a14="http://schemas.microsoft.com/office/drawing/2010/main" val="0"/>
+                </a:ext>
+              </a:extLst>
+            </a:blip>
+            <a:stretch>
+              <a:fillRect/>
+            </a:stretch>
+          </p:blipFill>
+          <p:spPr>
+            <a:xfrm>
+              <a:off x="8862369" y="6154379"/>
+              <a:ext cx="3329631" cy="703621"/>
+            </a:xfrm>
+            <a:prstGeom prst="rect">
+              <a:avLst/>
+            </a:prstGeom>
+          </p:spPr>
+        </p:pic>
+        <p:sp>
+          <p:nvSpPr>
+            <p:cNvPr id="9" name="Title 1"/>
+            <p:cNvSpPr txBox="1">
+              <a:spLocks/>
+            </p:cNvSpPr>
+            <p:nvPr/>
+          </p:nvSpPr>
+          <p:spPr>
+            <a:xfrm>
+              <a:off x="9143088" y="6305904"/>
+              <a:ext cx="3161907" cy="388783"/>
+            </a:xfrm>
+            <a:prstGeom prst="rect">
+              <a:avLst/>
+            </a:prstGeom>
+          </p:spPr>
+          <p:txBody>
+            <a:bodyPr vert="horz" lIns="91440" tIns="45720" rIns="91440" bIns="45720" rtlCol="0" anchor="b">
+              <a:noAutofit/>
+            </a:bodyPr>
+            <a:lstStyle>
+              <a:lvl1pPr algn="ctr" defTabSz="914400" rtl="0" eaLnBrk="1" latinLnBrk="0" hangingPunct="1">
+                <a:lnSpc>
+                  <a:spcPct val="90000"/>
+                </a:lnSpc>
+                <a:spcBef>
+                  <a:spcPct val="0"/>
+                </a:spcBef>
+                <a:buNone/>
+                <a:defRPr sz="6000" kern="1200">
+                  <a:solidFill>
+                    <a:schemeClr val="tx1"/>
+                  </a:solidFill>
+                  <a:latin typeface="+mj-lt"/>
+                  <a:ea typeface="+mj-ea"/>
+                  <a:cs typeface="+mj-cs"/>
+                </a:defRPr>
+              </a:lvl1pPr>
+            </a:lstStyle>
+            <a:p>
+              <a:pPr algn="l"/>
+              <a:r>
+                <a:rPr lang="en-US" sz="1600" b="1" dirty="0" smtClean="0"/>
+                <a:t>Silvia Murgescu</a:t>
+              </a:r>
+            </a:p>
+            <a:p>
+              <a:pPr algn="l"/>
+              <a:r>
+                <a:rPr lang="en-US" sz="1600" dirty="0" smtClean="0"/>
+                <a:t>Email: </a:t>
+              </a:r>
+              <a:r>
+                <a:rPr lang="en-US" sz="1600" dirty="0" err="1" smtClean="0"/>
+                <a:t>silvique_ms@yahoo.com</a:t>
+              </a:r>
+              <a:endParaRPr lang="en-US" sz="1600" dirty="0"/>
+            </a:p>
+          </p:txBody>
+        </p:sp>
+      </p:grpSp>
     </p:spTree>
     <p:extLst>
       <p:ext uri="{BB962C8B-B14F-4D97-AF65-F5344CB8AC3E}">
@@ -11068,10 +11796,177 @@
   <p:clrMapOvr>
     <a:masterClrMapping/>
   </p:clrMapOvr>
+  <p:timing>
+    <p:tnLst>
+      <p:par>
+        <p:cTn id="1" dur="indefinite" restart="never" nodeType="tmRoot"/>
+      </p:par>
+    </p:tnLst>
+  </p:timing>
 </p:sld>
 </file>
 
 <file path=ppt/slides/slide6.xml><?xml version="1.0" encoding="utf-8"?>
+<p:sld xmlns:a="http://schemas.openxmlformats.org/drawingml/2006/main" xmlns:r="http://schemas.openxmlformats.org/officeDocument/2006/relationships" xmlns:p="http://schemas.openxmlformats.org/presentationml/2006/main">
+  <p:cSld>
+    <p:spTree>
+      <p:nvGrpSpPr>
+        <p:cNvPr id="1" name=""/>
+        <p:cNvGrpSpPr/>
+        <p:nvPr/>
+      </p:nvGrpSpPr>
+      <p:grpSpPr>
+        <a:xfrm>
+          <a:off x="0" y="0"/>
+          <a:ext cx="0" cy="0"/>
+          <a:chOff x="0" y="0"/>
+          <a:chExt cx="0" cy="0"/>
+        </a:xfrm>
+      </p:grpSpPr>
+      <p:sp>
+        <p:nvSpPr>
+          <p:cNvPr id="2" name="Title 1"/>
+          <p:cNvSpPr>
+            <a:spLocks noGrp="1"/>
+          </p:cNvSpPr>
+          <p:nvPr>
+            <p:ph type="title"/>
+          </p:nvPr>
+        </p:nvSpPr>
+        <p:spPr/>
+        <p:txBody>
+          <a:bodyPr/>
+          <a:lstStyle/>
+          <a:p>
+            <a:r>
+              <a:rPr lang="en-US" dirty="0" smtClean="0"/>
+              <a:t>Bibliography</a:t>
+            </a:r>
+            <a:endParaRPr lang="en-US" dirty="0"/>
+          </a:p>
+        </p:txBody>
+      </p:sp>
+      <p:sp>
+        <p:nvSpPr>
+          <p:cNvPr id="3" name="Content Placeholder 2"/>
+          <p:cNvSpPr>
+            <a:spLocks noGrp="1"/>
+          </p:cNvSpPr>
+          <p:nvPr>
+            <p:ph idx="1"/>
+          </p:nvPr>
+        </p:nvSpPr>
+        <p:spPr/>
+        <p:txBody>
+          <a:bodyPr/>
+          <a:lstStyle/>
+          <a:p>
+            <a:r>
+              <a:rPr lang="en-US" dirty="0" smtClean="0"/>
+              <a:t>Juniper JAUT course and lab</a:t>
+            </a:r>
+          </a:p>
+          <a:p>
+            <a:r>
+              <a:rPr lang="en-US" dirty="0" smtClean="0"/>
+              <a:t>Day One: vMX Up and Running by Matt </a:t>
+            </a:r>
+            <a:r>
+              <a:rPr lang="en-US" dirty="0" err="1" smtClean="0"/>
+              <a:t>Dinham</a:t>
+            </a:r>
+            <a:endParaRPr lang="en-US" dirty="0" smtClean="0"/>
+          </a:p>
+          <a:p>
+            <a:r>
+              <a:rPr lang="en-US" dirty="0" err="1" smtClean="0"/>
+              <a:t>Youtube</a:t>
+            </a:r>
+            <a:r>
+              <a:rPr lang="en-US" dirty="0" smtClean="0"/>
+              <a:t>: </a:t>
+            </a:r>
+            <a:r>
+              <a:rPr lang="en-US" dirty="0" err="1"/>
+              <a:t>Git</a:t>
+            </a:r>
+            <a:r>
+              <a:rPr lang="en-US" dirty="0"/>
+              <a:t> &amp; GitHub Tutorial for </a:t>
+            </a:r>
+            <a:r>
+              <a:rPr lang="en-US" dirty="0" smtClean="0"/>
+              <a:t>Beginners by The Net Ninja</a:t>
+            </a:r>
+          </a:p>
+          <a:p>
+            <a:r>
+              <a:rPr lang="en-US" dirty="0" smtClean="0"/>
+              <a:t>Juniper GitHub page</a:t>
+            </a:r>
+            <a:r>
+              <a:rPr lang="en-US" dirty="0"/>
+              <a:t>: </a:t>
+            </a:r>
+            <a:r>
+              <a:rPr lang="en-US" dirty="0">
+                <a:hlinkClick r:id="rId2"/>
+              </a:rPr>
+              <a:t>https://</a:t>
+            </a:r>
+            <a:r>
+              <a:rPr lang="en-US" dirty="0" smtClean="0">
+                <a:hlinkClick r:id="rId2"/>
+              </a:rPr>
+              <a:t>github.com/Juniper</a:t>
+            </a:r>
+            <a:endParaRPr lang="en-US" dirty="0" smtClean="0"/>
+          </a:p>
+          <a:p>
+            <a:r>
+              <a:rPr lang="en-US" dirty="0" err="1" smtClean="0"/>
+              <a:t>Junos</a:t>
+            </a:r>
+            <a:r>
+              <a:rPr lang="en-US" dirty="0" smtClean="0"/>
+              <a:t> MPLS Application Features Guide, 2017.06.08</a:t>
+            </a:r>
+          </a:p>
+          <a:p>
+            <a:r>
+              <a:rPr lang="en-US" dirty="0" smtClean="0"/>
+              <a:t>Universal Access and Aggregation Mobile Backhaul Design Guide</a:t>
+            </a:r>
+          </a:p>
+          <a:p>
+            <a:endParaRPr lang="en-US" dirty="0"/>
+          </a:p>
+          <a:p>
+            <a:endParaRPr lang="en-US" dirty="0"/>
+          </a:p>
+        </p:txBody>
+      </p:sp>
+    </p:spTree>
+    <p:extLst>
+      <p:ext uri="{BB962C8B-B14F-4D97-AF65-F5344CB8AC3E}">
+        <p14:creationId xmlns:p14="http://schemas.microsoft.com/office/powerpoint/2010/main" val="199252049"/>
+      </p:ext>
+    </p:extLst>
+  </p:cSld>
+  <p:clrMapOvr>
+    <a:masterClrMapping/>
+  </p:clrMapOvr>
+  <p:timing>
+    <p:tnLst>
+      <p:par>
+        <p:cTn id="1" dur="indefinite" restart="never" nodeType="tmRoot"/>
+      </p:par>
+    </p:tnLst>
+  </p:timing>
+</p:sld>
+</file>
+
+<file path=ppt/slides/slide7.xml><?xml version="1.0" encoding="utf-8"?>
 <p:sld xmlns:a="http://schemas.openxmlformats.org/drawingml/2006/main" xmlns:r="http://schemas.openxmlformats.org/officeDocument/2006/relationships" xmlns:p="http://schemas.openxmlformats.org/presentationml/2006/main">
   <p:cSld>
     <p:spTree>
@@ -11200,63 +12095,6 @@
           </a:prstGeom>
         </p:spPr>
       </p:pic>
-      <p:sp>
-        <p:nvSpPr>
-          <p:cNvPr id="7" name="Title 1"/>
-          <p:cNvSpPr txBox="1">
-            <a:spLocks/>
-          </p:cNvSpPr>
-          <p:nvPr/>
-        </p:nvSpPr>
-        <p:spPr>
-          <a:xfrm>
-            <a:off x="9358362" y="6406173"/>
-            <a:ext cx="3161907" cy="388783"/>
-          </a:xfrm>
-          <a:prstGeom prst="rect">
-            <a:avLst/>
-          </a:prstGeom>
-        </p:spPr>
-        <p:txBody>
-          <a:bodyPr vert="horz" lIns="91440" tIns="45720" rIns="91440" bIns="45720" rtlCol="0" anchor="b">
-            <a:noAutofit/>
-          </a:bodyPr>
-          <a:lstStyle>
-            <a:lvl1pPr algn="ctr" defTabSz="914400" rtl="0" eaLnBrk="1" latinLnBrk="0" hangingPunct="1">
-              <a:lnSpc>
-                <a:spcPct val="90000"/>
-              </a:lnSpc>
-              <a:spcBef>
-                <a:spcPct val="0"/>
-              </a:spcBef>
-              <a:buNone/>
-              <a:defRPr sz="6000" kern="1200">
-                <a:solidFill>
-                  <a:schemeClr val="tx1"/>
-                </a:solidFill>
-                <a:latin typeface="+mj-lt"/>
-                <a:ea typeface="+mj-ea"/>
-                <a:cs typeface="+mj-cs"/>
-              </a:defRPr>
-            </a:lvl1pPr>
-          </a:lstStyle>
-          <a:p>
-            <a:pPr algn="l"/>
-            <a:r>
-              <a:rPr lang="en-US" sz="1600" b="1" dirty="0" smtClean="0"/>
-              <a:t>Silvia Murgescu</a:t>
-            </a:r>
-          </a:p>
-          <a:p>
-            <a:pPr algn="l"/>
-            <a:r>
-              <a:rPr lang="en-US" sz="1600" dirty="0" smtClean="0"/>
-              <a:t>Email: silvique_ms@yahoo.com</a:t>
-            </a:r>
-            <a:endParaRPr lang="en-US" sz="1600" dirty="0"/>
-          </a:p>
-        </p:txBody>
-      </p:sp>
       <p:sp>
         <p:nvSpPr>
           <p:cNvPr id="3" name="TextBox 2"/>
@@ -11435,6 +12273,112 @@
           </p:txBody>
         </p:sp>
       </p:grpSp>
+      <p:grpSp>
+        <p:nvGrpSpPr>
+          <p:cNvPr id="11" name="Group 10"/>
+          <p:cNvGrpSpPr/>
+          <p:nvPr/>
+        </p:nvGrpSpPr>
+        <p:grpSpPr>
+          <a:xfrm>
+            <a:off x="8862369" y="6154379"/>
+            <a:ext cx="3442626" cy="703621"/>
+            <a:chOff x="8862369" y="6154379"/>
+            <a:chExt cx="3442626" cy="703621"/>
+          </a:xfrm>
+        </p:grpSpPr>
+        <p:pic>
+          <p:nvPicPr>
+            <p:cNvPr id="12" name="Picture 11"/>
+            <p:cNvPicPr>
+              <a:picLocks noChangeAspect="1"/>
+            </p:cNvPicPr>
+            <p:nvPr/>
+          </p:nvPicPr>
+          <p:blipFill>
+            <a:blip r:embed="rId5">
+              <a:extLst>
+                <a:ext uri="{28A0092B-C50C-407E-A947-70E740481C1C}">
+                  <a14:useLocalDpi xmlns:a14="http://schemas.microsoft.com/office/drawing/2010/main" val="0"/>
+                </a:ext>
+              </a:extLst>
+            </a:blip>
+            <a:stretch>
+              <a:fillRect/>
+            </a:stretch>
+          </p:blipFill>
+          <p:spPr>
+            <a:xfrm>
+              <a:off x="8862369" y="6154379"/>
+              <a:ext cx="3329631" cy="703621"/>
+            </a:xfrm>
+            <a:prstGeom prst="rect">
+              <a:avLst/>
+            </a:prstGeom>
+          </p:spPr>
+        </p:pic>
+        <p:sp>
+          <p:nvSpPr>
+            <p:cNvPr id="13" name="Title 1"/>
+            <p:cNvSpPr txBox="1">
+              <a:spLocks/>
+            </p:cNvSpPr>
+            <p:nvPr/>
+          </p:nvSpPr>
+          <p:spPr>
+            <a:xfrm>
+              <a:off x="9143088" y="6305904"/>
+              <a:ext cx="3161907" cy="388783"/>
+            </a:xfrm>
+            <a:prstGeom prst="rect">
+              <a:avLst/>
+            </a:prstGeom>
+          </p:spPr>
+          <p:txBody>
+            <a:bodyPr vert="horz" lIns="91440" tIns="45720" rIns="91440" bIns="45720" rtlCol="0" anchor="b">
+              <a:noAutofit/>
+            </a:bodyPr>
+            <a:lstStyle>
+              <a:lvl1pPr algn="ctr" defTabSz="914400" rtl="0" eaLnBrk="1" latinLnBrk="0" hangingPunct="1">
+                <a:lnSpc>
+                  <a:spcPct val="90000"/>
+                </a:lnSpc>
+                <a:spcBef>
+                  <a:spcPct val="0"/>
+                </a:spcBef>
+                <a:buNone/>
+                <a:defRPr sz="6000" kern="1200">
+                  <a:solidFill>
+                    <a:schemeClr val="tx1"/>
+                  </a:solidFill>
+                  <a:latin typeface="+mj-lt"/>
+                  <a:ea typeface="+mj-ea"/>
+                  <a:cs typeface="+mj-cs"/>
+                </a:defRPr>
+              </a:lvl1pPr>
+            </a:lstStyle>
+            <a:p>
+              <a:pPr algn="l"/>
+              <a:r>
+                <a:rPr lang="en-US" sz="1600" b="1" dirty="0" smtClean="0"/>
+                <a:t>Silvia Murgescu</a:t>
+              </a:r>
+            </a:p>
+            <a:p>
+              <a:pPr algn="l"/>
+              <a:r>
+                <a:rPr lang="en-US" sz="1600" dirty="0" smtClean="0"/>
+                <a:t>Email: </a:t>
+              </a:r>
+              <a:r>
+                <a:rPr lang="en-US" sz="1600" dirty="0" err="1" smtClean="0"/>
+                <a:t>silvique_ms@yahoo.com</a:t>
+              </a:r>
+              <a:endParaRPr lang="en-US" sz="1600" dirty="0"/>
+            </a:p>
+          </p:txBody>
+        </p:sp>
+      </p:grpSp>
     </p:spTree>
     <p:extLst>
       <p:ext uri="{BB962C8B-B14F-4D97-AF65-F5344CB8AC3E}">
@@ -11445,10 +12389,17 @@
   <p:clrMapOvr>
     <a:masterClrMapping/>
   </p:clrMapOvr>
+  <p:timing>
+    <p:tnLst>
+      <p:par>
+        <p:cTn id="1" dur="indefinite" restart="never" nodeType="tmRoot"/>
+      </p:par>
+    </p:tnLst>
+  </p:timing>
 </p:sld>
 </file>
 
-<file path=ppt/slides/slide7.xml><?xml version="1.0" encoding="utf-8"?>
+<file path=ppt/slides/slide8.xml><?xml version="1.0" encoding="utf-8"?>
 <p:sld xmlns:a="http://schemas.openxmlformats.org/drawingml/2006/main" xmlns:r="http://schemas.openxmlformats.org/officeDocument/2006/relationships" xmlns:p="http://schemas.openxmlformats.org/presentationml/2006/main">
   <p:cSld>
     <p:spTree>
@@ -13710,63 +14661,112 @@
           </a:p>
         </p:txBody>
       </p:sp>
-      <p:sp>
-        <p:nvSpPr>
-          <p:cNvPr id="76" name="Title 1"/>
-          <p:cNvSpPr txBox="1">
-            <a:spLocks/>
-          </p:cNvSpPr>
-          <p:nvPr/>
-        </p:nvSpPr>
-        <p:spPr>
-          <a:xfrm>
-            <a:off x="9358362" y="6406173"/>
-            <a:ext cx="3161907" cy="388783"/>
-          </a:xfrm>
-          <a:prstGeom prst="rect">
-            <a:avLst/>
-          </a:prstGeom>
-        </p:spPr>
-        <p:txBody>
-          <a:bodyPr vert="horz" lIns="91440" tIns="45720" rIns="91440" bIns="45720" rtlCol="0" anchor="b">
-            <a:noAutofit/>
-          </a:bodyPr>
-          <a:lstStyle>
-            <a:lvl1pPr algn="ctr" defTabSz="914400" rtl="0" eaLnBrk="1" latinLnBrk="0" hangingPunct="1">
-              <a:lnSpc>
-                <a:spcPct val="90000"/>
-              </a:lnSpc>
-              <a:spcBef>
-                <a:spcPct val="0"/>
-              </a:spcBef>
-              <a:buNone/>
-              <a:defRPr sz="6000" kern="1200">
-                <a:solidFill>
-                  <a:schemeClr val="tx1"/>
-                </a:solidFill>
-                <a:latin typeface="+mj-lt"/>
-                <a:ea typeface="+mj-ea"/>
-                <a:cs typeface="+mj-cs"/>
-              </a:defRPr>
-            </a:lvl1pPr>
-          </a:lstStyle>
-          <a:p>
-            <a:pPr algn="l"/>
-            <a:r>
-              <a:rPr lang="en-US" sz="1600" b="1" dirty="0" smtClean="0"/>
-              <a:t>Silvia Murgescu</a:t>
-            </a:r>
-          </a:p>
-          <a:p>
-            <a:pPr algn="l"/>
-            <a:r>
-              <a:rPr lang="en-US" sz="1600" dirty="0" smtClean="0"/>
-              <a:t>Email: silvique_ms@yahoo.com</a:t>
-            </a:r>
-            <a:endParaRPr lang="en-US" sz="1600" dirty="0"/>
-          </a:p>
-        </p:txBody>
-      </p:sp>
+      <p:grpSp>
+        <p:nvGrpSpPr>
+          <p:cNvPr id="74" name="Group 73"/>
+          <p:cNvGrpSpPr/>
+          <p:nvPr/>
+        </p:nvGrpSpPr>
+        <p:grpSpPr>
+          <a:xfrm>
+            <a:off x="8862369" y="6154379"/>
+            <a:ext cx="3442626" cy="703621"/>
+            <a:chOff x="8862369" y="6154379"/>
+            <a:chExt cx="3442626" cy="703621"/>
+          </a:xfrm>
+        </p:grpSpPr>
+        <p:pic>
+          <p:nvPicPr>
+            <p:cNvPr id="75" name="Picture 74"/>
+            <p:cNvPicPr>
+              <a:picLocks noChangeAspect="1"/>
+            </p:cNvPicPr>
+            <p:nvPr/>
+          </p:nvPicPr>
+          <p:blipFill>
+            <a:blip r:embed="rId27">
+              <a:extLst>
+                <a:ext uri="{28A0092B-C50C-407E-A947-70E740481C1C}">
+                  <a14:useLocalDpi xmlns:a14="http://schemas.microsoft.com/office/drawing/2010/main" val="0"/>
+                </a:ext>
+              </a:extLst>
+            </a:blip>
+            <a:stretch>
+              <a:fillRect/>
+            </a:stretch>
+          </p:blipFill>
+          <p:spPr>
+            <a:xfrm>
+              <a:off x="8862369" y="6154379"/>
+              <a:ext cx="3329631" cy="703621"/>
+            </a:xfrm>
+            <a:prstGeom prst="rect">
+              <a:avLst/>
+            </a:prstGeom>
+          </p:spPr>
+        </p:pic>
+        <p:sp>
+          <p:nvSpPr>
+            <p:cNvPr id="77" name="Title 1"/>
+            <p:cNvSpPr txBox="1">
+              <a:spLocks/>
+            </p:cNvSpPr>
+            <p:nvPr/>
+          </p:nvSpPr>
+          <p:spPr>
+            <a:xfrm>
+              <a:off x="9143088" y="6305904"/>
+              <a:ext cx="3161907" cy="388783"/>
+            </a:xfrm>
+            <a:prstGeom prst="rect">
+              <a:avLst/>
+            </a:prstGeom>
+          </p:spPr>
+          <p:txBody>
+            <a:bodyPr vert="horz" lIns="91440" tIns="45720" rIns="91440" bIns="45720" rtlCol="0" anchor="b">
+              <a:noAutofit/>
+            </a:bodyPr>
+            <a:lstStyle>
+              <a:lvl1pPr algn="ctr" defTabSz="914400" rtl="0" eaLnBrk="1" latinLnBrk="0" hangingPunct="1">
+                <a:lnSpc>
+                  <a:spcPct val="90000"/>
+                </a:lnSpc>
+                <a:spcBef>
+                  <a:spcPct val="0"/>
+                </a:spcBef>
+                <a:buNone/>
+                <a:defRPr sz="6000" kern="1200">
+                  <a:solidFill>
+                    <a:schemeClr val="tx1"/>
+                  </a:solidFill>
+                  <a:latin typeface="+mj-lt"/>
+                  <a:ea typeface="+mj-ea"/>
+                  <a:cs typeface="+mj-cs"/>
+                </a:defRPr>
+              </a:lvl1pPr>
+            </a:lstStyle>
+            <a:p>
+              <a:pPr algn="l"/>
+              <a:r>
+                <a:rPr lang="en-US" sz="1600" b="1" dirty="0" smtClean="0"/>
+                <a:t>Silvia Murgescu</a:t>
+              </a:r>
+            </a:p>
+            <a:p>
+              <a:pPr algn="l"/>
+              <a:r>
+                <a:rPr lang="en-US" sz="1600" dirty="0" smtClean="0"/>
+                <a:t>Email: </a:t>
+              </a:r>
+              <a:r>
+                <a:rPr lang="en-US" sz="1600" dirty="0" err="1" smtClean="0"/>
+                <a:t>silvique_ms@yahoo.com</a:t>
+              </a:r>
+              <a:endParaRPr lang="en-US" sz="1600" dirty="0"/>
+            </a:p>
+          </p:txBody>
+        </p:sp>
+      </p:grpSp>
     </p:spTree>
     <p:extLst>
       <p:ext uri="{BB962C8B-B14F-4D97-AF65-F5344CB8AC3E}">
@@ -13777,6 +14777,500 @@
   <p:clrMapOvr>
     <a:masterClrMapping/>
   </p:clrMapOvr>
+  <p:timing>
+    <p:tnLst>
+      <p:par>
+        <p:cTn id="1" dur="indefinite" restart="never" nodeType="tmRoot"/>
+      </p:par>
+    </p:tnLst>
+  </p:timing>
+</p:sld>
+</file>
+
+<file path=ppt/slides/slide9.xml><?xml version="1.0" encoding="utf-8"?>
+<p:sld xmlns:a="http://schemas.openxmlformats.org/drawingml/2006/main" xmlns:r="http://schemas.openxmlformats.org/officeDocument/2006/relationships" xmlns:p="http://schemas.openxmlformats.org/presentationml/2006/main">
+  <p:cSld>
+    <p:spTree>
+      <p:nvGrpSpPr>
+        <p:cNvPr id="1" name=""/>
+        <p:cNvGrpSpPr/>
+        <p:nvPr/>
+      </p:nvGrpSpPr>
+      <p:grpSpPr>
+        <a:xfrm>
+          <a:off x="0" y="0"/>
+          <a:ext cx="0" cy="0"/>
+          <a:chOff x="0" y="0"/>
+          <a:chExt cx="0" cy="0"/>
+        </a:xfrm>
+      </p:grpSpPr>
+      <p:pic>
+        <p:nvPicPr>
+          <p:cNvPr id="5" name="Picture 4" descr="vMX.png"/>
+          <p:cNvPicPr>
+            <a:picLocks noChangeAspect="1"/>
+          </p:cNvPicPr>
+          <p:nvPr/>
+        </p:nvPicPr>
+        <p:blipFill>
+          <a:blip r:embed="rId2">
+            <a:alphaModFix amt="85000"/>
+            <a:duotone>
+              <a:schemeClr val="accent5">
+                <a:shade val="45000"/>
+                <a:satMod val="135000"/>
+              </a:schemeClr>
+              <a:prstClr val="white"/>
+            </a:duotone>
+            <a:extLst>
+              <a:ext uri="{28A0092B-C50C-407E-A947-70E740481C1C}">
+                <a14:useLocalDpi xmlns:a14="http://schemas.microsoft.com/office/drawing/2010/main" val="0"/>
+              </a:ext>
+            </a:extLst>
+          </a:blip>
+          <a:stretch>
+            <a:fillRect/>
+          </a:stretch>
+        </p:blipFill>
+        <p:spPr>
+          <a:xfrm rot="17019106">
+            <a:off x="3409759" y="2837380"/>
+            <a:ext cx="3397051" cy="1970807"/>
+          </a:xfrm>
+          <a:prstGeom prst="rect">
+            <a:avLst/>
+          </a:prstGeom>
+        </p:spPr>
+      </p:pic>
+      <p:sp>
+        <p:nvSpPr>
+          <p:cNvPr id="6" name="TextBox 5"/>
+          <p:cNvSpPr txBox="1"/>
+          <p:nvPr/>
+        </p:nvSpPr>
+        <p:spPr>
+          <a:xfrm rot="21123822">
+            <a:off x="1550636" y="977959"/>
+            <a:ext cx="3803798" cy="1569660"/>
+          </a:xfrm>
+          <a:prstGeom prst="rect">
+            <a:avLst/>
+          </a:prstGeom>
+          <a:noFill/>
+          <a:ln>
+            <a:noFill/>
+          </a:ln>
+        </p:spPr>
+        <p:txBody>
+          <a:bodyPr wrap="none" rtlCol="0">
+            <a:spAutoFit/>
+          </a:bodyPr>
+          <a:lstStyle/>
+          <a:p>
+            <a:r>
+              <a:rPr lang="en-US" sz="9600" b="1" smtClean="0">
+                <a:ln cap="rnd">
+                  <a:gradFill>
+                    <a:gsLst>
+                      <a:gs pos="0">
+                        <a:schemeClr val="accent1">
+                          <a:lumMod val="5000"/>
+                          <a:lumOff val="95000"/>
+                        </a:schemeClr>
+                      </a:gs>
+                      <a:gs pos="74000">
+                        <a:schemeClr val="accent1">
+                          <a:lumMod val="45000"/>
+                          <a:lumOff val="55000"/>
+                        </a:schemeClr>
+                      </a:gs>
+                      <a:gs pos="83000">
+                        <a:schemeClr val="accent1">
+                          <a:lumMod val="45000"/>
+                          <a:lumOff val="55000"/>
+                        </a:schemeClr>
+                      </a:gs>
+                      <a:gs pos="100000">
+                        <a:schemeClr val="accent1">
+                          <a:lumMod val="30000"/>
+                          <a:lumOff val="70000"/>
+                        </a:schemeClr>
+                      </a:gs>
+                    </a:gsLst>
+                    <a:lin ang="5400000" scaled="1"/>
+                  </a:gradFill>
+                </a:ln>
+                <a:gradFill flip="none" rotWithShape="1">
+                  <a:gsLst>
+                    <a:gs pos="0">
+                      <a:schemeClr val="accent1">
+                        <a:lumMod val="67000"/>
+                      </a:schemeClr>
+                    </a:gs>
+                    <a:gs pos="63000">
+                      <a:schemeClr val="accent5">
+                        <a:lumMod val="60000"/>
+                        <a:lumOff val="40000"/>
+                      </a:schemeClr>
+                    </a:gs>
+                    <a:gs pos="100000">
+                      <a:schemeClr val="accent1">
+                        <a:lumMod val="60000"/>
+                        <a:lumOff val="40000"/>
+                      </a:schemeClr>
+                    </a:gs>
+                  </a:gsLst>
+                  <a:lin ang="15600000" scaled="0"/>
+                  <a:tileRect/>
+                </a:gradFill>
+                <a:effectLst>
+                  <a:outerShdw blurRad="50800" dist="50800" dir="5400000" algn="ctr" rotWithShape="0">
+                    <a:schemeClr val="accent5">
+                      <a:lumMod val="40000"/>
+                      <a:lumOff val="60000"/>
+                    </a:schemeClr>
+                  </a:outerShdw>
+                </a:effectLst>
+                <a:latin typeface="Cooper Black" charset="0"/>
+                <a:ea typeface="Cooper Black" charset="0"/>
+                <a:cs typeface="Cooper Black" charset="0"/>
+              </a:rPr>
+              <a:t>Lifter</a:t>
+            </a:r>
+            <a:endParaRPr lang="en-US" sz="9600" b="1" dirty="0">
+              <a:ln cap="rnd">
+                <a:gradFill>
+                  <a:gsLst>
+                    <a:gs pos="0">
+                      <a:schemeClr val="accent1">
+                        <a:lumMod val="5000"/>
+                        <a:lumOff val="95000"/>
+                      </a:schemeClr>
+                    </a:gs>
+                    <a:gs pos="74000">
+                      <a:schemeClr val="accent1">
+                        <a:lumMod val="45000"/>
+                        <a:lumOff val="55000"/>
+                      </a:schemeClr>
+                    </a:gs>
+                    <a:gs pos="83000">
+                      <a:schemeClr val="accent1">
+                        <a:lumMod val="45000"/>
+                        <a:lumOff val="55000"/>
+                      </a:schemeClr>
+                    </a:gs>
+                    <a:gs pos="100000">
+                      <a:schemeClr val="accent1">
+                        <a:lumMod val="30000"/>
+                        <a:lumOff val="70000"/>
+                      </a:schemeClr>
+                    </a:gs>
+                  </a:gsLst>
+                  <a:lin ang="5400000" scaled="1"/>
+                </a:gradFill>
+              </a:ln>
+              <a:gradFill flip="none" rotWithShape="1">
+                <a:gsLst>
+                  <a:gs pos="0">
+                    <a:schemeClr val="accent1">
+                      <a:lumMod val="67000"/>
+                    </a:schemeClr>
+                  </a:gs>
+                  <a:gs pos="63000">
+                    <a:schemeClr val="accent5">
+                      <a:lumMod val="60000"/>
+                      <a:lumOff val="40000"/>
+                    </a:schemeClr>
+                  </a:gs>
+                  <a:gs pos="100000">
+                    <a:schemeClr val="accent1">
+                      <a:lumMod val="60000"/>
+                      <a:lumOff val="40000"/>
+                    </a:schemeClr>
+                  </a:gs>
+                </a:gsLst>
+                <a:lin ang="15600000" scaled="0"/>
+                <a:tileRect/>
+              </a:gradFill>
+              <a:effectLst>
+                <a:outerShdw blurRad="50800" dist="50800" dir="5400000" algn="ctr" rotWithShape="0">
+                  <a:schemeClr val="accent5">
+                    <a:lumMod val="40000"/>
+                    <a:lumOff val="60000"/>
+                  </a:schemeClr>
+                </a:outerShdw>
+              </a:effectLst>
+              <a:latin typeface="Cooper Black" charset="0"/>
+              <a:ea typeface="Cooper Black" charset="0"/>
+              <a:cs typeface="Cooper Black" charset="0"/>
+            </a:endParaRPr>
+          </a:p>
+        </p:txBody>
+      </p:sp>
+      <p:pic>
+        <p:nvPicPr>
+          <p:cNvPr id="7" name="Picture 6"/>
+          <p:cNvPicPr>
+            <a:picLocks noChangeAspect="1"/>
+          </p:cNvPicPr>
+          <p:nvPr/>
+        </p:nvPicPr>
+        <p:blipFill>
+          <a:blip r:embed="rId3">
+            <a:duotone>
+              <a:schemeClr val="accent5">
+                <a:shade val="45000"/>
+                <a:satMod val="135000"/>
+              </a:schemeClr>
+              <a:prstClr val="white"/>
+            </a:duotone>
+            <a:extLst>
+              <a:ext uri="{BEBA8EAE-BF5A-486C-A8C5-ECC9F3942E4B}">
+                <a14:imgProps xmlns:a14="http://schemas.microsoft.com/office/drawing/2010/main">
+                  <a14:imgLayer r:embed="rId4">
+                    <a14:imgEffect>
+                      <a14:colorTemperature colorTemp="8510"/>
+                    </a14:imgEffect>
+                    <a14:imgEffect>
+                      <a14:saturation sat="242000"/>
+                    </a14:imgEffect>
+                  </a14:imgLayer>
+                </a14:imgProps>
+              </a:ext>
+              <a:ext uri="{28A0092B-C50C-407E-A947-70E740481C1C}">
+                <a14:useLocalDpi xmlns:a14="http://schemas.microsoft.com/office/drawing/2010/main" val="0"/>
+              </a:ext>
+            </a:extLst>
+          </a:blip>
+          <a:stretch>
+            <a:fillRect/>
+          </a:stretch>
+        </p:blipFill>
+        <p:spPr>
+          <a:xfrm>
+            <a:off x="3347872" y="5942621"/>
+            <a:ext cx="936965" cy="936965"/>
+          </a:xfrm>
+          <a:prstGeom prst="rect">
+            <a:avLst/>
+          </a:prstGeom>
+          <a:effectLst/>
+        </p:spPr>
+      </p:pic>
+      <p:pic>
+        <p:nvPicPr>
+          <p:cNvPr id="8" name="Picture 7"/>
+          <p:cNvPicPr>
+            <a:picLocks noChangeAspect="1"/>
+          </p:cNvPicPr>
+          <p:nvPr/>
+        </p:nvPicPr>
+        <p:blipFill>
+          <a:blip r:embed="rId5">
+            <a:alphaModFix amt="61000"/>
+            <a:grayscl/>
+            <a:extLst>
+              <a:ext uri="{28A0092B-C50C-407E-A947-70E740481C1C}">
+                <a14:useLocalDpi xmlns:a14="http://schemas.microsoft.com/office/drawing/2010/main" val="0"/>
+              </a:ext>
+            </a:extLst>
+          </a:blip>
+          <a:stretch>
+            <a:fillRect/>
+          </a:stretch>
+        </p:blipFill>
+        <p:spPr>
+          <a:xfrm>
+            <a:off x="401263" y="629821"/>
+            <a:ext cx="4064000" cy="5638800"/>
+          </a:xfrm>
+          <a:prstGeom prst="rect">
+            <a:avLst/>
+          </a:prstGeom>
+        </p:spPr>
+      </p:pic>
+      <p:sp>
+        <p:nvSpPr>
+          <p:cNvPr id="9" name="TextBox 8"/>
+          <p:cNvSpPr txBox="1"/>
+          <p:nvPr/>
+        </p:nvSpPr>
+        <p:spPr>
+          <a:xfrm rot="563424">
+            <a:off x="1422887" y="200"/>
+            <a:ext cx="2645276" cy="1569660"/>
+          </a:xfrm>
+          <a:prstGeom prst="rect">
+            <a:avLst/>
+          </a:prstGeom>
+          <a:noFill/>
+          <a:ln>
+            <a:noFill/>
+          </a:ln>
+        </p:spPr>
+        <p:txBody>
+          <a:bodyPr wrap="none" rtlCol="0">
+            <a:spAutoFit/>
+          </a:bodyPr>
+          <a:lstStyle/>
+          <a:p>
+            <a:r>
+              <a:rPr lang="en-US" sz="9600" b="1" smtClean="0">
+                <a:ln cap="rnd">
+                  <a:gradFill>
+                    <a:gsLst>
+                      <a:gs pos="0">
+                        <a:schemeClr val="accent1">
+                          <a:lumMod val="5000"/>
+                          <a:lumOff val="95000"/>
+                        </a:schemeClr>
+                      </a:gs>
+                      <a:gs pos="74000">
+                        <a:schemeClr val="accent1">
+                          <a:lumMod val="45000"/>
+                          <a:lumOff val="55000"/>
+                        </a:schemeClr>
+                      </a:gs>
+                      <a:gs pos="83000">
+                        <a:schemeClr val="accent1">
+                          <a:lumMod val="45000"/>
+                          <a:lumOff val="55000"/>
+                        </a:schemeClr>
+                      </a:gs>
+                      <a:gs pos="100000">
+                        <a:schemeClr val="accent1">
+                          <a:lumMod val="30000"/>
+                          <a:lumOff val="70000"/>
+                        </a:schemeClr>
+                      </a:gs>
+                    </a:gsLst>
+                    <a:lin ang="5400000" scaled="1"/>
+                  </a:gradFill>
+                </a:ln>
+                <a:gradFill flip="none" rotWithShape="1">
+                  <a:gsLst>
+                    <a:gs pos="0">
+                      <a:schemeClr val="accent1">
+                        <a:lumMod val="67000"/>
+                      </a:schemeClr>
+                    </a:gs>
+                    <a:gs pos="63000">
+                      <a:schemeClr val="accent5">
+                        <a:lumMod val="60000"/>
+                        <a:lumOff val="40000"/>
+                      </a:schemeClr>
+                    </a:gs>
+                    <a:gs pos="100000">
+                      <a:schemeClr val="accent1">
+                        <a:lumMod val="60000"/>
+                        <a:lumOff val="40000"/>
+                      </a:schemeClr>
+                    </a:gs>
+                  </a:gsLst>
+                  <a:lin ang="15600000" scaled="0"/>
+                  <a:tileRect/>
+                </a:gradFill>
+                <a:effectLst>
+                  <a:outerShdw blurRad="50800" dist="50800" dir="5400000" algn="ctr" rotWithShape="0">
+                    <a:schemeClr val="accent5">
+                      <a:lumMod val="40000"/>
+                      <a:lumOff val="60000"/>
+                    </a:schemeClr>
+                  </a:outerShdw>
+                </a:effectLst>
+                <a:latin typeface="Cooper Black" charset="0"/>
+                <a:ea typeface="Cooper Black" charset="0"/>
+                <a:cs typeface="Cooper Black" charset="0"/>
+              </a:rPr>
+              <a:t>Sky</a:t>
+            </a:r>
+            <a:endParaRPr lang="en-US" sz="9600" b="1" dirty="0">
+              <a:ln cap="rnd">
+                <a:gradFill>
+                  <a:gsLst>
+                    <a:gs pos="0">
+                      <a:schemeClr val="accent1">
+                        <a:lumMod val="5000"/>
+                        <a:lumOff val="95000"/>
+                      </a:schemeClr>
+                    </a:gs>
+                    <a:gs pos="74000">
+                      <a:schemeClr val="accent1">
+                        <a:lumMod val="45000"/>
+                        <a:lumOff val="55000"/>
+                      </a:schemeClr>
+                    </a:gs>
+                    <a:gs pos="83000">
+                      <a:schemeClr val="accent1">
+                        <a:lumMod val="45000"/>
+                        <a:lumOff val="55000"/>
+                      </a:schemeClr>
+                    </a:gs>
+                    <a:gs pos="100000">
+                      <a:schemeClr val="accent1">
+                        <a:lumMod val="30000"/>
+                        <a:lumOff val="70000"/>
+                      </a:schemeClr>
+                    </a:gs>
+                  </a:gsLst>
+                  <a:lin ang="5400000" scaled="1"/>
+                </a:gradFill>
+              </a:ln>
+              <a:gradFill flip="none" rotWithShape="1">
+                <a:gsLst>
+                  <a:gs pos="0">
+                    <a:schemeClr val="accent1">
+                      <a:lumMod val="67000"/>
+                    </a:schemeClr>
+                  </a:gs>
+                  <a:gs pos="63000">
+                    <a:schemeClr val="accent5">
+                      <a:lumMod val="60000"/>
+                      <a:lumOff val="40000"/>
+                    </a:schemeClr>
+                  </a:gs>
+                  <a:gs pos="100000">
+                    <a:schemeClr val="accent1">
+                      <a:lumMod val="60000"/>
+                      <a:lumOff val="40000"/>
+                    </a:schemeClr>
+                  </a:gs>
+                </a:gsLst>
+                <a:lin ang="15600000" scaled="0"/>
+                <a:tileRect/>
+              </a:gradFill>
+              <a:effectLst>
+                <a:outerShdw blurRad="50800" dist="50800" dir="5400000" algn="ctr" rotWithShape="0">
+                  <a:schemeClr val="accent5">
+                    <a:lumMod val="40000"/>
+                    <a:lumOff val="60000"/>
+                  </a:schemeClr>
+                </a:outerShdw>
+              </a:effectLst>
+              <a:latin typeface="Cooper Black" charset="0"/>
+              <a:ea typeface="Cooper Black" charset="0"/>
+              <a:cs typeface="Cooper Black" charset="0"/>
+            </a:endParaRPr>
+          </a:p>
+        </p:txBody>
+      </p:sp>
+    </p:spTree>
+    <p:extLst>
+      <p:ext uri="{BB962C8B-B14F-4D97-AF65-F5344CB8AC3E}">
+        <p14:creationId xmlns:p14="http://schemas.microsoft.com/office/powerpoint/2010/main" val="1680102825"/>
+      </p:ext>
+    </p:extLst>
+  </p:cSld>
+  <p:clrMapOvr>
+    <a:masterClrMapping/>
+  </p:clrMapOvr>
+  <p:timing>
+    <p:tnLst>
+      <p:par>
+        <p:cTn id="1" dur="indefinite" restart="never" nodeType="tmRoot"/>
+      </p:par>
+    </p:tnLst>
+  </p:timing>
 </p:sld>
 </file>
 

</xml_diff>